<commit_message>
Added conclusion to poster
</commit_message>
<xml_diff>
--- a/final_submission/MR_Final_Poster_MD_YJ.pptx
+++ b/final_submission/MR_Final_Poster_MD_YJ.pptx
@@ -14,14 +14,14 @@
   <p:notesSz cx="6858000" cy="9144000"/>
   <p:embeddedFontLst>
     <p:embeddedFont>
-      <p:font typeface="Lato" panose="020F0502020204030203" pitchFamily="34" charset="77"/>
+      <p:font typeface="Lato" panose="020B0604020202020204" charset="0"/>
       <p:regular r:id="rId4"/>
       <p:bold r:id="rId5"/>
       <p:italic r:id="rId6"/>
       <p:boldItalic r:id="rId7"/>
     </p:embeddedFont>
     <p:embeddedFont>
-      <p:font typeface="Raleway" panose="020B0503030101060003" pitchFamily="34" charset="77"/>
+      <p:font typeface="Raleway" panose="020B0604020202020204" charset="0"/>
       <p:regular r:id="rId8"/>
       <p:bold r:id="rId9"/>
       <p:italic r:id="rId10"/>
@@ -908,6 +908,11 @@
         </p:txBody>
       </p:sp>
     </p:spTree>
+    <p:extLst>
+      <p:ext uri="{BB962C8B-B14F-4D97-AF65-F5344CB8AC3E}">
+        <p14:creationId xmlns:p14="http://schemas.microsoft.com/office/powerpoint/2010/main" val="3771477031"/>
+      </p:ext>
+    </p:extLst>
   </p:cSld>
   <p:clrMap bg1="lt1" tx1="dk1" bg2="dk2" tx2="lt2" accent1="accent1" accent2="accent2" accent3="accent3" accent4="accent4" accent5="accent5" accent6="accent6" hlink="hlink" folHlink="folHlink"/>
   <p:notesStyle>
@@ -8530,10 +8535,10 @@
               <a:buChar char="•"/>
             </a:pPr>
             <a:r>
-              <a:rPr lang="en-US" sz="4400"/>
+              <a:rPr lang="en-US" sz="4400" dirty="0"/>
               <a:t>Create a program that uses different search algorithms to solve Sokoban</a:t>
             </a:r>
-            <a:endParaRPr sz="4400"/>
+            <a:endParaRPr sz="4400" dirty="0"/>
           </a:p>
           <a:p>
             <a:pPr marL="571680" marR="0" lvl="0" indent="-571320" algn="l" rtl="0">
@@ -8550,10 +8555,10 @@
               <a:buChar char="•"/>
             </a:pPr>
             <a:r>
-              <a:rPr lang="en-US" sz="4400"/>
+              <a:rPr lang="en-US" sz="4400" dirty="0"/>
               <a:t>Search algorithms like IDA* &amp; MCTS have numerous real-world applications</a:t>
             </a:r>
-            <a:endParaRPr sz="4400"/>
+            <a:endParaRPr sz="4400" dirty="0"/>
           </a:p>
           <a:p>
             <a:pPr marL="914400" marR="0" lvl="1" indent="-508000" algn="l" rtl="0">
@@ -8570,10 +8575,10 @@
               <a:buChar char="○"/>
             </a:pPr>
             <a:r>
-              <a:rPr lang="en-US" sz="4400"/>
+              <a:rPr lang="en-US" sz="4400" dirty="0"/>
               <a:t>AI planning, pathfinding in video games, autonomous vehicles</a:t>
             </a:r>
-            <a:endParaRPr sz="4400"/>
+            <a:endParaRPr sz="4400" dirty="0"/>
           </a:p>
           <a:p>
             <a:pPr marL="571680" marR="0" lvl="0" indent="-571320" algn="l" rtl="0">
@@ -8590,10 +8595,10 @@
               <a:buChar char="•"/>
             </a:pPr>
             <a:r>
-              <a:rPr lang="en-US" sz="4400"/>
+              <a:rPr lang="en-US" sz="4400" dirty="0"/>
               <a:t>Sokoban represents a complex domain in which to evaluate these algorithms</a:t>
             </a:r>
-            <a:endParaRPr sz="4400"/>
+            <a:endParaRPr sz="4400" dirty="0"/>
           </a:p>
           <a:p>
             <a:pPr marL="571680" marR="0" lvl="0" indent="-571320" algn="l" rtl="0">
@@ -8610,10 +8615,10 @@
               <a:buChar char="•"/>
             </a:pPr>
             <a:r>
-              <a:rPr lang="en-US" sz="4400"/>
+              <a:rPr lang="en-US" sz="4400" dirty="0"/>
               <a:t>Solving Sokoban is difficult - it is a NP-hard, PSPACE-complete problem </a:t>
             </a:r>
-            <a:endParaRPr sz="4400"/>
+            <a:endParaRPr sz="4400" dirty="0"/>
           </a:p>
           <a:p>
             <a:pPr marL="0" marR="0" lvl="0" indent="0" algn="l" rtl="0">
@@ -8628,7 +8633,7 @@
               </a:spcAft>
               <a:buNone/>
             </a:pPr>
-            <a:endParaRPr sz="4400" b="0" i="0" u="none" strike="noStrike" cap="none">
+            <a:endParaRPr sz="4400" b="0" i="0" u="none" strike="noStrike" cap="none" dirty="0">
               <a:latin typeface="Arial"/>
               <a:ea typeface="Arial"/>
               <a:cs typeface="Arial"/>
@@ -9623,7 +9628,7 @@
               <a:buNone/>
             </a:pPr>
             <a:r>
-              <a:rPr lang="en-US" sz="9600" b="1">
+              <a:rPr lang="en-US" sz="9600" b="1" dirty="0">
                 <a:latin typeface="Times New Roman"/>
                 <a:ea typeface="Times New Roman"/>
                 <a:cs typeface="Times New Roman"/>
@@ -9632,14 +9637,18 @@
               <a:t>Sokoban, Solved: Modeling Sokoban Puzzles as Search Problems </a:t>
             </a:r>
             <a:r>
-              <a:rPr lang="en-US" sz="9600" b="1"/>
+              <a:rPr lang="en-US" sz="9600" b="1" dirty="0"/>
               <a:t> </a:t>
             </a:r>
+            <a:r>
+              <a:rPr lang="en-US" sz="1800" dirty="0"/>
+              <a:t/>
+            </a:r>
             <a:br>
-              <a:rPr lang="en-US" sz="1800"/>
+              <a:rPr lang="en-US" sz="1800" dirty="0"/>
             </a:br>
             <a:r>
-              <a:rPr lang="en-US" sz="6000">
+              <a:rPr lang="en-US" sz="6000" dirty="0">
                 <a:latin typeface="Times New Roman"/>
                 <a:ea typeface="Times New Roman"/>
                 <a:cs typeface="Times New Roman"/>
@@ -9647,8 +9656,17 @@
               </a:rPr>
               <a:t>Matthew Days and Yangzi Jiang</a:t>
             </a:r>
+            <a:r>
+              <a:rPr lang="en-US" sz="1800" dirty="0">
+                <a:latin typeface="Times New Roman"/>
+                <a:ea typeface="Times New Roman"/>
+                <a:cs typeface="Times New Roman"/>
+                <a:sym typeface="Times New Roman"/>
+              </a:rPr>
+              <a:t/>
+            </a:r>
             <a:br>
-              <a:rPr lang="en-US" sz="1800">
+              <a:rPr lang="en-US" sz="1800" dirty="0">
                 <a:latin typeface="Times New Roman"/>
                 <a:ea typeface="Times New Roman"/>
                 <a:cs typeface="Times New Roman"/>
@@ -9656,7 +9674,7 @@
               </a:rPr>
             </a:br>
             <a:r>
-              <a:rPr lang="en-US" sz="6000">
+              <a:rPr lang="en-US" sz="6000" dirty="0">
                 <a:latin typeface="Times New Roman"/>
                 <a:ea typeface="Times New Roman"/>
                 <a:cs typeface="Times New Roman"/>
@@ -9664,7 +9682,7 @@
               </a:rPr>
               <a:t>Davidson College Departments of Mathematics and Computer Science</a:t>
             </a:r>
-            <a:endParaRPr sz="6000">
+            <a:endParaRPr sz="6000" dirty="0">
               <a:latin typeface="Times New Roman"/>
               <a:ea typeface="Times New Roman"/>
               <a:cs typeface="Times New Roman"/>
@@ -9681,7 +9699,7 @@
               </a:spcAft>
               <a:buNone/>
             </a:pPr>
-            <a:endParaRPr sz="6600" b="1">
+            <a:endParaRPr sz="6600" b="1" dirty="0">
               <a:latin typeface="Times New Roman"/>
               <a:ea typeface="Times New Roman"/>
               <a:cs typeface="Times New Roman"/>
@@ -10600,10 +10618,10 @@
                 <a:buChar char="•"/>
               </a:pPr>
               <a:r>
-                <a:rPr lang="en-US" sz="4400"/>
+                <a:rPr lang="en-US" sz="4400" dirty="0"/>
                 <a:t>Graph search algorithm that uses heuristic function as guide</a:t>
               </a:r>
-              <a:endParaRPr sz="4400"/>
+              <a:endParaRPr sz="4400" dirty="0"/>
             </a:p>
             <a:p>
               <a:pPr marL="571680" marR="0" lvl="0" indent="-571320" algn="l" rtl="0">
@@ -10624,10 +10642,10 @@
                 <a:buChar char="•"/>
               </a:pPr>
               <a:r>
-                <a:rPr lang="en-US" sz="4400"/>
+                <a:rPr lang="en-US" sz="4400" dirty="0"/>
                 <a:t>Trade off between time and space:</a:t>
               </a:r>
-              <a:endParaRPr sz="4400"/>
+              <a:endParaRPr sz="4400" dirty="0"/>
             </a:p>
             <a:p>
               <a:pPr marL="914400" marR="0" lvl="1" indent="-508000" algn="l" rtl="0">
@@ -10648,10 +10666,10 @@
                 <a:buChar char="○"/>
               </a:pPr>
               <a:r>
-                <a:rPr lang="en-US" sz="4400"/>
+                <a:rPr lang="en-US" sz="4400" dirty="0"/>
                 <a:t>IDA* Saves storage space with DFS &amp; pruning</a:t>
               </a:r>
-              <a:endParaRPr sz="4400"/>
+              <a:endParaRPr sz="4400" dirty="0"/>
             </a:p>
             <a:p>
               <a:pPr marL="1371600" marR="0" lvl="2" indent="-508000" algn="l" rtl="0">
@@ -10672,10 +10690,18 @@
                 <a:buChar char="■"/>
               </a:pPr>
               <a:r>
-                <a:rPr lang="en-US" sz="4400"/>
-                <a:t>Addresses the high space-complexity issue with with Sokoban.</a:t>
+                <a:rPr lang="en-US" sz="4400" dirty="0"/>
+                <a:t>Addresses the high space-complexity issue with </a:t>
               </a:r>
-              <a:endParaRPr sz="4400"/>
+              <a:r>
+                <a:rPr lang="en-US" sz="4400" dirty="0" err="1"/>
+                <a:t>with</a:t>
+              </a:r>
+              <a:r>
+                <a:rPr lang="en-US" sz="4400" dirty="0"/>
+                <a:t> Sokoban.</a:t>
+              </a:r>
+              <a:endParaRPr sz="4400" dirty="0"/>
             </a:p>
             <a:p>
               <a:pPr marL="914400" marR="0" lvl="1" indent="-508000" algn="l" rtl="0">
@@ -10692,10 +10718,10 @@
                 <a:buChar char="○"/>
               </a:pPr>
               <a:r>
-                <a:rPr lang="en-US" sz="4400"/>
+                <a:rPr lang="en-US" sz="4400" dirty="0"/>
                 <a:t>Vanilla IDA* is more </a:t>
               </a:r>
-              <a:endParaRPr sz="4400"/>
+              <a:endParaRPr sz="4400" dirty="0"/>
             </a:p>
             <a:p>
               <a:pPr marL="914400" marR="0" lvl="0" indent="0" algn="l" rtl="0">
@@ -10711,10 +10737,10 @@
                 <a:buNone/>
               </a:pPr>
               <a:r>
-                <a:rPr lang="en-US" sz="4400"/>
+                <a:rPr lang="en-US" sz="4400" dirty="0"/>
                 <a:t>time-costly as it may </a:t>
               </a:r>
-              <a:endParaRPr sz="4400"/>
+              <a:endParaRPr sz="4400" dirty="0"/>
             </a:p>
             <a:p>
               <a:pPr marL="914400" marR="0" lvl="0" indent="0" algn="l" rtl="0">
@@ -10730,10 +10756,10 @@
                 <a:buNone/>
               </a:pPr>
               <a:r>
-                <a:rPr lang="en-US" sz="4400"/>
+                <a:rPr lang="en-US" sz="4400" dirty="0"/>
                 <a:t>revisit the same states </a:t>
               </a:r>
-              <a:endParaRPr sz="4400"/>
+              <a:endParaRPr sz="4400" dirty="0"/>
             </a:p>
             <a:p>
               <a:pPr marL="1371600" marR="0" lvl="2" indent="-508000" algn="l" rtl="0">
@@ -10750,10 +10776,18 @@
                 <a:buChar char="■"/>
               </a:pPr>
               <a:r>
-                <a:rPr lang="en-US" sz="4400"/>
-                <a:t>Transition hashtable </a:t>
+                <a:rPr lang="en-US" sz="4400" dirty="0"/>
+                <a:t>Transition </a:t>
               </a:r>
-              <a:endParaRPr sz="4400"/>
+              <a:r>
+                <a:rPr lang="en-US" sz="4400" dirty="0" err="1"/>
+                <a:t>hashtable</a:t>
+              </a:r>
+              <a:r>
+                <a:rPr lang="en-US" sz="4400" dirty="0"/>
+                <a:t> </a:t>
+              </a:r>
+              <a:endParaRPr sz="4400" dirty="0"/>
             </a:p>
             <a:p>
               <a:pPr marL="1371600" marR="0" lvl="0" indent="0" algn="l" rtl="0">
@@ -10769,10 +10803,10 @@
                 <a:buNone/>
               </a:pPr>
               <a:r>
-                <a:rPr lang="en-US" sz="4400"/>
+                <a:rPr lang="en-US" sz="4400" dirty="0"/>
                 <a:t>to record </a:t>
               </a:r>
-              <a:endParaRPr sz="4400"/>
+              <a:endParaRPr sz="4400" dirty="0"/>
             </a:p>
             <a:p>
               <a:pPr marL="1371600" marR="0" lvl="0" indent="0" algn="l" rtl="0">
@@ -10788,10 +10822,10 @@
                 <a:buNone/>
               </a:pPr>
               <a:r>
-                <a:rPr lang="en-US" sz="4400"/>
+                <a:rPr lang="en-US" sz="4400" dirty="0"/>
                 <a:t>visited states</a:t>
               </a:r>
-              <a:endParaRPr sz="4400"/>
+              <a:endParaRPr sz="4400" dirty="0"/>
             </a:p>
           </p:txBody>
         </p:sp>
@@ -10801,7 +10835,7 @@
           <p:cNvPr id="4" name="Picture 3">
             <a:extLst>
               <a:ext uri="{FF2B5EF4-FFF2-40B4-BE49-F238E27FC236}">
-                <a16:creationId xmlns:a16="http://schemas.microsoft.com/office/drawing/2014/main" id="{BC1B9889-D448-6B4E-BCF7-79AFDBE9ADE2}"/>
+                <a16:creationId xmlns="" xmlns:a16="http://schemas.microsoft.com/office/drawing/2014/main" id="{BC1B9889-D448-6B4E-BCF7-79AFDBE9ADE2}"/>
               </a:ext>
             </a:extLst>
           </p:cNvPr>
@@ -10831,7 +10865,7 @@
           <p:cNvPr id="5" name="Picture 4">
             <a:extLst>
               <a:ext uri="{FF2B5EF4-FFF2-40B4-BE49-F238E27FC236}">
-                <a16:creationId xmlns:a16="http://schemas.microsoft.com/office/drawing/2014/main" id="{F8C77EF6-9CEA-BC42-A33A-3046BBF0143B}"/>
+                <a16:creationId xmlns="" xmlns:a16="http://schemas.microsoft.com/office/drawing/2014/main" id="{F8C77EF6-9CEA-BC42-A33A-3046BBF0143B}"/>
               </a:ext>
             </a:extLst>
           </p:cNvPr>
@@ -10861,7 +10895,7 @@
           <p:cNvPr id="6" name="Picture 5">
             <a:extLst>
               <a:ext uri="{FF2B5EF4-FFF2-40B4-BE49-F238E27FC236}">
-                <a16:creationId xmlns:a16="http://schemas.microsoft.com/office/drawing/2014/main" id="{705B4E10-CDFC-1445-BB18-54638CDA3040}"/>
+                <a16:creationId xmlns="" xmlns:a16="http://schemas.microsoft.com/office/drawing/2014/main" id="{705B4E10-CDFC-1445-BB18-54638CDA3040}"/>
               </a:ext>
             </a:extLst>
           </p:cNvPr>
@@ -10891,7 +10925,7 @@
           <p:cNvPr id="7" name="Picture 6">
             <a:extLst>
               <a:ext uri="{FF2B5EF4-FFF2-40B4-BE49-F238E27FC236}">
-                <a16:creationId xmlns:a16="http://schemas.microsoft.com/office/drawing/2014/main" id="{9249F9FC-73A5-3948-B8AB-2CFDB594D64F}"/>
+                <a16:creationId xmlns="" xmlns:a16="http://schemas.microsoft.com/office/drawing/2014/main" id="{9249F9FC-73A5-3948-B8AB-2CFDB594D64F}"/>
               </a:ext>
             </a:extLst>
           </p:cNvPr>
@@ -10921,7 +10955,7 @@
           <p:cNvPr id="9" name="Picture 8">
             <a:extLst>
               <a:ext uri="{FF2B5EF4-FFF2-40B4-BE49-F238E27FC236}">
-                <a16:creationId xmlns:a16="http://schemas.microsoft.com/office/drawing/2014/main" id="{B6A98A47-4B21-E045-8251-A6F1AD53CAA0}"/>
+                <a16:creationId xmlns="" xmlns:a16="http://schemas.microsoft.com/office/drawing/2014/main" id="{B6A98A47-4B21-E045-8251-A6F1AD53CAA0}"/>
               </a:ext>
             </a:extLst>
           </p:cNvPr>
@@ -10951,7 +10985,7 @@
           <p:cNvPr id="10" name="Picture 9">
             <a:extLst>
               <a:ext uri="{FF2B5EF4-FFF2-40B4-BE49-F238E27FC236}">
-                <a16:creationId xmlns:a16="http://schemas.microsoft.com/office/drawing/2014/main" id="{D8FD9B7C-DB38-284B-9016-C9318F8E5568}"/>
+                <a16:creationId xmlns="" xmlns:a16="http://schemas.microsoft.com/office/drawing/2014/main" id="{D8FD9B7C-DB38-284B-9016-C9318F8E5568}"/>
               </a:ext>
             </a:extLst>
           </p:cNvPr>
@@ -10981,7 +11015,7 @@
           <p:cNvPr id="12" name="Straight Connector 11">
             <a:extLst>
               <a:ext uri="{FF2B5EF4-FFF2-40B4-BE49-F238E27FC236}">
-                <a16:creationId xmlns:a16="http://schemas.microsoft.com/office/drawing/2014/main" id="{AE78B1C6-71AE-4741-908E-0D76A4BC4BD1}"/>
+                <a16:creationId xmlns="" xmlns:a16="http://schemas.microsoft.com/office/drawing/2014/main" id="{AE78B1C6-71AE-4741-908E-0D76A4BC4BD1}"/>
               </a:ext>
             </a:extLst>
           </p:cNvPr>
@@ -11023,6 +11057,226 @@
           </a:fontRef>
         </p:style>
       </p:cxnSp>
+      <p:sp>
+        <p:nvSpPr>
+          <p:cNvPr id="2" name="Rectangle 1"/>
+          <p:cNvSpPr/>
+          <p:nvPr/>
+        </p:nvSpPr>
+        <p:spPr>
+          <a:xfrm>
+            <a:off x="23485819" y="25197372"/>
+            <a:ext cx="10891452" cy="9571851"/>
+          </a:xfrm>
+          <a:prstGeom prst="rect">
+            <a:avLst/>
+          </a:prstGeom>
+        </p:spPr>
+        <p:txBody>
+          <a:bodyPr wrap="square">
+            <a:spAutoFit/>
+          </a:bodyPr>
+          <a:lstStyle/>
+          <a:p>
+            <a:pPr marL="571680" lvl="0" indent="-571320">
+              <a:buSzPts val="4400"/>
+              <a:buFont typeface="Arial"/>
+              <a:buChar char="•"/>
+            </a:pPr>
+            <a:r>
+              <a:rPr lang="en-US" sz="4400" dirty="0" smtClean="0"/>
+              <a:t>Modeled Sokoban as a search problem to test  various search algorithms</a:t>
+            </a:r>
+          </a:p>
+          <a:p>
+            <a:pPr marL="571680" lvl="0" indent="-571320">
+              <a:buSzPts val="4400"/>
+              <a:buFont typeface="Arial"/>
+              <a:buChar char="•"/>
+            </a:pPr>
+            <a:r>
+              <a:rPr lang="en-US" sz="4400" dirty="0" smtClean="0"/>
+              <a:t>BFS runtime outperformed IDA* runtime</a:t>
+            </a:r>
+          </a:p>
+          <a:p>
+            <a:pPr marL="1389062" lvl="0" indent="-571500">
+              <a:buSzPts val="4400"/>
+              <a:buFont typeface="Courier New" panose="02070309020205020404" pitchFamily="49" charset="0"/>
+              <a:buChar char="o"/>
+            </a:pPr>
+            <a:r>
+              <a:rPr lang="en-US" sz="4400" dirty="0" smtClean="0"/>
+              <a:t>Result of heuristic calculation, which     allows for less nodes generated</a:t>
+            </a:r>
+          </a:p>
+          <a:p>
+            <a:pPr marL="571680" lvl="1" indent="-571320">
+              <a:buSzPts val="4400"/>
+              <a:buFont typeface="Arial"/>
+              <a:buChar char="•"/>
+            </a:pPr>
+            <a:r>
+              <a:rPr lang="en-US" sz="4400" dirty="0" smtClean="0"/>
+              <a:t>IDA*: move-optimal; BFS </a:t>
+            </a:r>
+            <a:r>
+              <a:rPr lang="en-US" sz="4400" dirty="0" smtClean="0"/>
+              <a:t>not</a:t>
+            </a:r>
+          </a:p>
+          <a:p>
+            <a:pPr marL="571680" lvl="1" indent="-571320">
+              <a:buSzPts val="4400"/>
+              <a:buFont typeface="Arial"/>
+              <a:buChar char="•"/>
+            </a:pPr>
+            <a:r>
+              <a:rPr lang="en-US" sz="4400" dirty="0"/>
+              <a:t>As puzzle difficulty  increases, performance  declines exponentially</a:t>
+            </a:r>
+          </a:p>
+          <a:p>
+            <a:pPr marL="571680" lvl="1" indent="-571320">
+              <a:buSzPts val="4400"/>
+              <a:buFont typeface="Arial"/>
+              <a:buChar char="•"/>
+            </a:pPr>
+            <a:endParaRPr lang="en-US" sz="4400" dirty="0" smtClean="0"/>
+          </a:p>
+          <a:p>
+            <a:pPr marL="571680" lvl="1" indent="-571320">
+              <a:buSzPts val="4400"/>
+              <a:buFont typeface="Arial"/>
+              <a:buChar char="•"/>
+            </a:pPr>
+            <a:endParaRPr lang="en-US" sz="4400" dirty="0"/>
+          </a:p>
+          <a:p>
+            <a:pPr marL="571680" lvl="1" indent="-571320">
+              <a:buSzPts val="4400"/>
+              <a:buFont typeface="Arial"/>
+              <a:buChar char="•"/>
+            </a:pPr>
+            <a:endParaRPr lang="en-US" sz="4400" dirty="0" smtClean="0"/>
+          </a:p>
+          <a:p>
+            <a:pPr marL="571680" lvl="1" indent="-571320">
+              <a:buSzPts val="4400"/>
+              <a:buFont typeface="Arial"/>
+              <a:buChar char="•"/>
+            </a:pPr>
+            <a:endParaRPr lang="en-US" sz="4400" dirty="0"/>
+          </a:p>
+          <a:p>
+            <a:pPr marL="571680" lvl="1" indent="-571320">
+              <a:buSzPts val="4400"/>
+              <a:buFont typeface="Arial"/>
+              <a:buChar char="•"/>
+            </a:pPr>
+            <a:endParaRPr lang="en-US" sz="4400" dirty="0" smtClean="0"/>
+          </a:p>
+          <a:p>
+            <a:pPr marL="571680" lvl="1" indent="-571320">
+              <a:buSzPts val="4400"/>
+              <a:buFont typeface="Arial"/>
+              <a:buChar char="•"/>
+            </a:pPr>
+            <a:endParaRPr lang="en-US" sz="4400" dirty="0"/>
+          </a:p>
+        </p:txBody>
+      </p:sp>
+      <p:sp>
+        <p:nvSpPr>
+          <p:cNvPr id="58" name="Rectangle 57"/>
+          <p:cNvSpPr/>
+          <p:nvPr/>
+        </p:nvSpPr>
+        <p:spPr>
+          <a:xfrm>
+            <a:off x="34424560" y="25149246"/>
+            <a:ext cx="10891452" cy="6863417"/>
+          </a:xfrm>
+          <a:prstGeom prst="rect">
+            <a:avLst/>
+          </a:prstGeom>
+        </p:spPr>
+        <p:txBody>
+          <a:bodyPr wrap="square">
+            <a:spAutoFit/>
+          </a:bodyPr>
+          <a:lstStyle/>
+          <a:p>
+            <a:pPr marL="571680" lvl="0" indent="-571320">
+              <a:buSzPts val="4400"/>
+              <a:buFont typeface="Arial"/>
+              <a:buChar char="•"/>
+            </a:pPr>
+            <a:r>
+              <a:rPr lang="en-US" sz="4400" dirty="0" smtClean="0"/>
+              <a:t>MCTS </a:t>
+            </a:r>
+            <a:r>
+              <a:rPr lang="en-US" sz="4400" dirty="0" smtClean="0"/>
+              <a:t>too slow to solve Sokoban without optimizations &amp; domain dependent info</a:t>
+            </a:r>
+          </a:p>
+          <a:p>
+            <a:pPr marL="571680" lvl="0" indent="-571320">
+              <a:buSzPts val="4400"/>
+              <a:buFont typeface="Arial"/>
+              <a:buChar char="•"/>
+            </a:pPr>
+            <a:r>
+              <a:rPr lang="en-US" sz="4400" dirty="0" smtClean="0"/>
+              <a:t>Further exploration:</a:t>
+            </a:r>
+          </a:p>
+          <a:p>
+            <a:pPr marL="1438275" lvl="8" indent="-571500">
+              <a:buSzPts val="4400"/>
+              <a:buFont typeface="Courier New" panose="02070309020205020404" pitchFamily="49" charset="0"/>
+              <a:buChar char="o"/>
+            </a:pPr>
+            <a:r>
+              <a:rPr lang="en-US" sz="4400" dirty="0" smtClean="0"/>
+              <a:t>More domain-specific info: improved deadlocks, PI-corrals, goal &amp; tunnel macros</a:t>
+            </a:r>
+          </a:p>
+          <a:p>
+            <a:pPr marL="1438275" lvl="8" indent="-571500">
+              <a:buSzPts val="4400"/>
+              <a:buFont typeface="Courier New" panose="02070309020205020404" pitchFamily="49" charset="0"/>
+              <a:buChar char="o"/>
+            </a:pPr>
+            <a:r>
+              <a:rPr lang="en-US" sz="4400" dirty="0" smtClean="0"/>
+              <a:t>Improved heuristics: </a:t>
+            </a:r>
+            <a:r>
+              <a:rPr lang="en-US" sz="4400" dirty="0" err="1" smtClean="0"/>
+              <a:t>Minmatching</a:t>
+            </a:r>
+            <a:r>
+              <a:rPr lang="en-US" sz="4400" dirty="0"/>
+              <a:t> (minimum cost perfect matching </a:t>
+            </a:r>
+            <a:r>
+              <a:rPr lang="en-US" sz="4400" dirty="0" smtClean="0"/>
+              <a:t>in </a:t>
+            </a:r>
+            <a:r>
+              <a:rPr lang="en-US" sz="4400" dirty="0"/>
+              <a:t>bipartite </a:t>
+            </a:r>
+            <a:r>
+              <a:rPr lang="en-US" sz="4400" dirty="0" smtClean="0"/>
+              <a:t>graph of boxes and goals)</a:t>
+            </a:r>
+            <a:endParaRPr lang="en-US" sz="4400" dirty="0" smtClean="0"/>
+          </a:p>
+        </p:txBody>
+      </p:sp>
     </p:spTree>
   </p:cSld>
   <p:clrMapOvr>

</xml_diff>